<commit_message>
Remove version information from the technical system design document
</commit_message>
<xml_diff>
--- a/docs/Appgate-Keycloak-Entra-AD-PingDirectory-Azure-AppgateHybrid-ExpressRoute-Exec-Summary.pptx
+++ b/docs/Appgate-Keycloak-Entra-AD-PingDirectory-Azure-AppgateHybrid-ExpressRoute-Exec-Summary.pptx
@@ -5,14 +5,14 @@
     <p:sldMasterId id="2147483648" r:id="rId1"/>
   </p:sldMasterIdLst>
   <p:sldIdLst>
-    <p:sldId id="256" r:id="rId7"/>
-    <p:sldId id="257" r:id="rId8"/>
-    <p:sldId id="258" r:id="rId9"/>
-    <p:sldId id="259" r:id="rId10"/>
-    <p:sldId id="260" r:id="rId11"/>
-    <p:sldId id="261" r:id="rId12"/>
-    <p:sldId id="262" r:id="rId13"/>
-    <p:sldId id="263" r:id="rId14"/>
+    <p:sldId id="256" r:id="rId2"/>
+    <p:sldId id="257" r:id="rId3"/>
+    <p:sldId id="258" r:id="rId4"/>
+    <p:sldId id="259" r:id="rId5"/>
+    <p:sldId id="260" r:id="rId6"/>
+    <p:sldId id="261" r:id="rId7"/>
+    <p:sldId id="262" r:id="rId8"/>
+    <p:sldId id="263" r:id="rId9"/>
   </p:sldIdLst>
   <p:sldSz cx="9144000" cy="6858000" type="screen4x3"/>
   <p:notesSz cx="6858000" cy="9144000"/>
@@ -111,6 +111,22 @@
       </a:defRPr>
     </a:lvl9pPr>
   </p:defaultTextStyle>
+  <p:extLst>
+    <p:ext uri="{EFAFB233-063F-42B5-8137-9DF3F51BA10A}">
+      <p15:sldGuideLst xmlns:p15="http://schemas.microsoft.com/office/powerpoint/2012/main">
+        <p15:guide id="1" orient="horz" pos="2160">
+          <p15:clr>
+            <a:srgbClr val="A4A3A4"/>
+          </p15:clr>
+        </p15:guide>
+        <p15:guide id="2" pos="2880">
+          <p15:clr>
+            <a:srgbClr val="A4A3A4"/>
+          </p15:clr>
+        </p15:guide>
+      </p15:sldGuideLst>
+    </p:ext>
+  </p:extLst>
 </p:presentation>
 </file>
 
@@ -152,10 +168,9 @@
           <a:lstStyle/>
           <a:p>
             <a:r>
-              <a:rPr lang="en-US" smtClean="0"/>
+              <a:rPr lang="en-US"/>
               <a:t>Click to edit Master title style</a:t>
             </a:r>
-            <a:endParaRPr lang="en-US"/>
           </a:p>
         </p:txBody>
       </p:sp>
@@ -271,10 +286,9 @@
           </a:lstStyle>
           <a:p>
             <a:r>
-              <a:rPr lang="en-US" smtClean="0"/>
+              <a:rPr lang="en-US"/>
               <a:t>Click to edit Master subtitle style</a:t>
             </a:r>
-            <a:endParaRPr lang="en-US"/>
           </a:p>
         </p:txBody>
       </p:sp>
@@ -295,7 +309,7 @@
           <a:p>
             <a:fld id="{5BCAD085-E8A6-8845-BD4E-CB4CCA059FC4}" type="datetimeFigureOut">
               <a:rPr lang="en-US" smtClean="0"/>
-              <a:t>1/27/13</a:t>
+              <a:t>2/24/2026</a:t>
             </a:fld>
             <a:endParaRPr lang="en-US"/>
           </a:p>
@@ -389,10 +403,9 @@
           <a:lstStyle/>
           <a:p>
             <a:r>
-              <a:rPr lang="en-US" smtClean="0"/>
+              <a:rPr lang="en-US"/>
               <a:t>Click to edit Master title style</a:t>
             </a:r>
-            <a:endParaRPr lang="en-US"/>
           </a:p>
         </p:txBody>
       </p:sp>
@@ -413,38 +426,37 @@
           <a:p>
             <a:pPr lvl="0"/>
             <a:r>
-              <a:rPr lang="en-US" smtClean="0"/>
+              <a:rPr lang="en-US"/>
               <a:t>Click to edit Master text styles</a:t>
             </a:r>
           </a:p>
           <a:p>
             <a:pPr lvl="1"/>
             <a:r>
-              <a:rPr lang="en-US" smtClean="0"/>
+              <a:rPr lang="en-US"/>
               <a:t>Second level</a:t>
             </a:r>
           </a:p>
           <a:p>
             <a:pPr lvl="2"/>
             <a:r>
-              <a:rPr lang="en-US" smtClean="0"/>
+              <a:rPr lang="en-US"/>
               <a:t>Third level</a:t>
             </a:r>
           </a:p>
           <a:p>
             <a:pPr lvl="3"/>
             <a:r>
-              <a:rPr lang="en-US" smtClean="0"/>
+              <a:rPr lang="en-US"/>
               <a:t>Fourth level</a:t>
             </a:r>
           </a:p>
           <a:p>
             <a:pPr lvl="4"/>
             <a:r>
-              <a:rPr lang="en-US" smtClean="0"/>
+              <a:rPr lang="en-US"/>
               <a:t>Fifth level</a:t>
             </a:r>
-            <a:endParaRPr lang="en-US"/>
           </a:p>
         </p:txBody>
       </p:sp>
@@ -465,7 +477,7 @@
           <a:p>
             <a:fld id="{5BCAD085-E8A6-8845-BD4E-CB4CCA059FC4}" type="datetimeFigureOut">
               <a:rPr lang="en-US" smtClean="0"/>
-              <a:t>1/27/13</a:t>
+              <a:t>2/24/2026</a:t>
             </a:fld>
             <a:endParaRPr lang="en-US"/>
           </a:p>
@@ -564,10 +576,9 @@
           <a:lstStyle/>
           <a:p>
             <a:r>
-              <a:rPr lang="en-US" smtClean="0"/>
+              <a:rPr lang="en-US"/>
               <a:t>Click to edit Master title style</a:t>
             </a:r>
-            <a:endParaRPr lang="en-US"/>
           </a:p>
         </p:txBody>
       </p:sp>
@@ -593,38 +604,37 @@
           <a:p>
             <a:pPr lvl="0"/>
             <a:r>
-              <a:rPr lang="en-US" smtClean="0"/>
+              <a:rPr lang="en-US"/>
               <a:t>Click to edit Master text styles</a:t>
             </a:r>
           </a:p>
           <a:p>
             <a:pPr lvl="1"/>
             <a:r>
-              <a:rPr lang="en-US" smtClean="0"/>
+              <a:rPr lang="en-US"/>
               <a:t>Second level</a:t>
             </a:r>
           </a:p>
           <a:p>
             <a:pPr lvl="2"/>
             <a:r>
-              <a:rPr lang="en-US" smtClean="0"/>
+              <a:rPr lang="en-US"/>
               <a:t>Third level</a:t>
             </a:r>
           </a:p>
           <a:p>
             <a:pPr lvl="3"/>
             <a:r>
-              <a:rPr lang="en-US" smtClean="0"/>
+              <a:rPr lang="en-US"/>
               <a:t>Fourth level</a:t>
             </a:r>
           </a:p>
           <a:p>
             <a:pPr lvl="4"/>
             <a:r>
-              <a:rPr lang="en-US" smtClean="0"/>
+              <a:rPr lang="en-US"/>
               <a:t>Fifth level</a:t>
             </a:r>
-            <a:endParaRPr lang="en-US"/>
           </a:p>
         </p:txBody>
       </p:sp>
@@ -645,7 +655,7 @@
           <a:p>
             <a:fld id="{5BCAD085-E8A6-8845-BD4E-CB4CCA059FC4}" type="datetimeFigureOut">
               <a:rPr lang="en-US" smtClean="0"/>
-              <a:t>1/27/13</a:t>
+              <a:t>2/24/2026</a:t>
             </a:fld>
             <a:endParaRPr lang="en-US"/>
           </a:p>
@@ -739,10 +749,9 @@
           <a:lstStyle/>
           <a:p>
             <a:r>
-              <a:rPr lang="en-US" smtClean="0"/>
+              <a:rPr lang="en-US"/>
               <a:t>Click to edit Master title style</a:t>
             </a:r>
-            <a:endParaRPr lang="en-US"/>
           </a:p>
         </p:txBody>
       </p:sp>
@@ -763,38 +772,37 @@
           <a:p>
             <a:pPr lvl="0"/>
             <a:r>
-              <a:rPr lang="en-US" smtClean="0"/>
+              <a:rPr lang="en-US"/>
               <a:t>Click to edit Master text styles</a:t>
             </a:r>
           </a:p>
           <a:p>
             <a:pPr lvl="1"/>
             <a:r>
-              <a:rPr lang="en-US" smtClean="0"/>
+              <a:rPr lang="en-US"/>
               <a:t>Second level</a:t>
             </a:r>
           </a:p>
           <a:p>
             <a:pPr lvl="2"/>
             <a:r>
-              <a:rPr lang="en-US" smtClean="0"/>
+              <a:rPr lang="en-US"/>
               <a:t>Third level</a:t>
             </a:r>
           </a:p>
           <a:p>
             <a:pPr lvl="3"/>
             <a:r>
-              <a:rPr lang="en-US" smtClean="0"/>
+              <a:rPr lang="en-US"/>
               <a:t>Fourth level</a:t>
             </a:r>
           </a:p>
           <a:p>
             <a:pPr lvl="4"/>
             <a:r>
-              <a:rPr lang="en-US" smtClean="0"/>
+              <a:rPr lang="en-US"/>
               <a:t>Fifth level</a:t>
             </a:r>
-            <a:endParaRPr lang="en-US"/>
           </a:p>
         </p:txBody>
       </p:sp>
@@ -815,7 +823,7 @@
           <a:p>
             <a:fld id="{5BCAD085-E8A6-8845-BD4E-CB4CCA059FC4}" type="datetimeFigureOut">
               <a:rPr lang="en-US" smtClean="0"/>
-              <a:t>1/27/13</a:t>
+              <a:t>2/24/2026</a:t>
             </a:fld>
             <a:endParaRPr lang="en-US"/>
           </a:p>
@@ -918,10 +926,9 @@
           </a:lstStyle>
           <a:p>
             <a:r>
-              <a:rPr lang="en-US" smtClean="0"/>
+              <a:rPr lang="en-US"/>
               <a:t>Click to edit Master title style</a:t>
             </a:r>
-            <a:endParaRPr lang="en-US"/>
           </a:p>
         </p:txBody>
       </p:sp>
@@ -1038,7 +1045,7 @@
           <a:p>
             <a:pPr lvl="0"/>
             <a:r>
-              <a:rPr lang="en-US" smtClean="0"/>
+              <a:rPr lang="en-US"/>
               <a:t>Click to edit Master text styles</a:t>
             </a:r>
           </a:p>
@@ -1061,7 +1068,7 @@
           <a:p>
             <a:fld id="{5BCAD085-E8A6-8845-BD4E-CB4CCA059FC4}" type="datetimeFigureOut">
               <a:rPr lang="en-US" smtClean="0"/>
-              <a:t>1/27/13</a:t>
+              <a:t>2/24/2026</a:t>
             </a:fld>
             <a:endParaRPr lang="en-US"/>
           </a:p>
@@ -1155,10 +1162,9 @@
           <a:lstStyle/>
           <a:p>
             <a:r>
-              <a:rPr lang="en-US" smtClean="0"/>
+              <a:rPr lang="en-US"/>
               <a:t>Click to edit Master title style</a:t>
             </a:r>
-            <a:endParaRPr lang="en-US"/>
           </a:p>
         </p:txBody>
       </p:sp>
@@ -1212,38 +1218,37 @@
           <a:p>
             <a:pPr lvl="0"/>
             <a:r>
-              <a:rPr lang="en-US" smtClean="0"/>
+              <a:rPr lang="en-US"/>
               <a:t>Click to edit Master text styles</a:t>
             </a:r>
           </a:p>
           <a:p>
             <a:pPr lvl="1"/>
             <a:r>
-              <a:rPr lang="en-US" smtClean="0"/>
+              <a:rPr lang="en-US"/>
               <a:t>Second level</a:t>
             </a:r>
           </a:p>
           <a:p>
             <a:pPr lvl="2"/>
             <a:r>
-              <a:rPr lang="en-US" smtClean="0"/>
+              <a:rPr lang="en-US"/>
               <a:t>Third level</a:t>
             </a:r>
           </a:p>
           <a:p>
             <a:pPr lvl="3"/>
             <a:r>
-              <a:rPr lang="en-US" smtClean="0"/>
+              <a:rPr lang="en-US"/>
               <a:t>Fourth level</a:t>
             </a:r>
           </a:p>
           <a:p>
             <a:pPr lvl="4"/>
             <a:r>
-              <a:rPr lang="en-US" smtClean="0"/>
+              <a:rPr lang="en-US"/>
               <a:t>Fifth level</a:t>
             </a:r>
-            <a:endParaRPr lang="en-US"/>
           </a:p>
         </p:txBody>
       </p:sp>
@@ -1297,38 +1302,37 @@
           <a:p>
             <a:pPr lvl="0"/>
             <a:r>
-              <a:rPr lang="en-US" smtClean="0"/>
+              <a:rPr lang="en-US"/>
               <a:t>Click to edit Master text styles</a:t>
             </a:r>
           </a:p>
           <a:p>
             <a:pPr lvl="1"/>
             <a:r>
-              <a:rPr lang="en-US" smtClean="0"/>
+              <a:rPr lang="en-US"/>
               <a:t>Second level</a:t>
             </a:r>
           </a:p>
           <a:p>
             <a:pPr lvl="2"/>
             <a:r>
-              <a:rPr lang="en-US" smtClean="0"/>
+              <a:rPr lang="en-US"/>
               <a:t>Third level</a:t>
             </a:r>
           </a:p>
           <a:p>
             <a:pPr lvl="3"/>
             <a:r>
-              <a:rPr lang="en-US" smtClean="0"/>
+              <a:rPr lang="en-US"/>
               <a:t>Fourth level</a:t>
             </a:r>
           </a:p>
           <a:p>
             <a:pPr lvl="4"/>
             <a:r>
-              <a:rPr lang="en-US" smtClean="0"/>
+              <a:rPr lang="en-US"/>
               <a:t>Fifth level</a:t>
             </a:r>
-            <a:endParaRPr lang="en-US"/>
           </a:p>
         </p:txBody>
       </p:sp>
@@ -1349,7 +1353,7 @@
           <a:p>
             <a:fld id="{5BCAD085-E8A6-8845-BD4E-CB4CCA059FC4}" type="datetimeFigureOut">
               <a:rPr lang="en-US" smtClean="0"/>
-              <a:t>1/27/13</a:t>
+              <a:t>2/24/2026</a:t>
             </a:fld>
             <a:endParaRPr lang="en-US"/>
           </a:p>
@@ -1447,10 +1451,9 @@
           </a:lstStyle>
           <a:p>
             <a:r>
-              <a:rPr lang="en-US" smtClean="0"/>
+              <a:rPr lang="en-US"/>
               <a:t>Click to edit Master title style</a:t>
             </a:r>
-            <a:endParaRPr lang="en-US"/>
           </a:p>
         </p:txBody>
       </p:sp>
@@ -1513,7 +1516,7 @@
           <a:p>
             <a:pPr lvl="0"/>
             <a:r>
-              <a:rPr lang="en-US" smtClean="0"/>
+              <a:rPr lang="en-US"/>
               <a:t>Click to edit Master text styles</a:t>
             </a:r>
           </a:p>
@@ -1569,38 +1572,37 @@
           <a:p>
             <a:pPr lvl="0"/>
             <a:r>
-              <a:rPr lang="en-US" smtClean="0"/>
+              <a:rPr lang="en-US"/>
               <a:t>Click to edit Master text styles</a:t>
             </a:r>
           </a:p>
           <a:p>
             <a:pPr lvl="1"/>
             <a:r>
-              <a:rPr lang="en-US" smtClean="0"/>
+              <a:rPr lang="en-US"/>
               <a:t>Second level</a:t>
             </a:r>
           </a:p>
           <a:p>
             <a:pPr lvl="2"/>
             <a:r>
-              <a:rPr lang="en-US" smtClean="0"/>
+              <a:rPr lang="en-US"/>
               <a:t>Third level</a:t>
             </a:r>
           </a:p>
           <a:p>
             <a:pPr lvl="3"/>
             <a:r>
-              <a:rPr lang="en-US" smtClean="0"/>
+              <a:rPr lang="en-US"/>
               <a:t>Fourth level</a:t>
             </a:r>
           </a:p>
           <a:p>
             <a:pPr lvl="4"/>
             <a:r>
-              <a:rPr lang="en-US" smtClean="0"/>
+              <a:rPr lang="en-US"/>
               <a:t>Fifth level</a:t>
             </a:r>
-            <a:endParaRPr lang="en-US"/>
           </a:p>
         </p:txBody>
       </p:sp>
@@ -1663,7 +1665,7 @@
           <a:p>
             <a:pPr lvl="0"/>
             <a:r>
-              <a:rPr lang="en-US" smtClean="0"/>
+              <a:rPr lang="en-US"/>
               <a:t>Click to edit Master text styles</a:t>
             </a:r>
           </a:p>
@@ -1719,38 +1721,37 @@
           <a:p>
             <a:pPr lvl="0"/>
             <a:r>
-              <a:rPr lang="en-US" smtClean="0"/>
+              <a:rPr lang="en-US"/>
               <a:t>Click to edit Master text styles</a:t>
             </a:r>
           </a:p>
           <a:p>
             <a:pPr lvl="1"/>
             <a:r>
-              <a:rPr lang="en-US" smtClean="0"/>
+              <a:rPr lang="en-US"/>
               <a:t>Second level</a:t>
             </a:r>
           </a:p>
           <a:p>
             <a:pPr lvl="2"/>
             <a:r>
-              <a:rPr lang="en-US" smtClean="0"/>
+              <a:rPr lang="en-US"/>
               <a:t>Third level</a:t>
             </a:r>
           </a:p>
           <a:p>
             <a:pPr lvl="3"/>
             <a:r>
-              <a:rPr lang="en-US" smtClean="0"/>
+              <a:rPr lang="en-US"/>
               <a:t>Fourth level</a:t>
             </a:r>
           </a:p>
           <a:p>
             <a:pPr lvl="4"/>
             <a:r>
-              <a:rPr lang="en-US" smtClean="0"/>
+              <a:rPr lang="en-US"/>
               <a:t>Fifth level</a:t>
             </a:r>
-            <a:endParaRPr lang="en-US"/>
           </a:p>
         </p:txBody>
       </p:sp>
@@ -1771,7 +1772,7 @@
           <a:p>
             <a:fld id="{5BCAD085-E8A6-8845-BD4E-CB4CCA059FC4}" type="datetimeFigureOut">
               <a:rPr lang="en-US" smtClean="0"/>
-              <a:t>1/27/13</a:t>
+              <a:t>2/24/2026</a:t>
             </a:fld>
             <a:endParaRPr lang="en-US"/>
           </a:p>
@@ -1865,10 +1866,9 @@
           <a:lstStyle/>
           <a:p>
             <a:r>
-              <a:rPr lang="en-US" smtClean="0"/>
+              <a:rPr lang="en-US"/>
               <a:t>Click to edit Master title style</a:t>
             </a:r>
-            <a:endParaRPr lang="en-US"/>
           </a:p>
         </p:txBody>
       </p:sp>
@@ -1889,7 +1889,7 @@
           <a:p>
             <a:fld id="{5BCAD085-E8A6-8845-BD4E-CB4CCA059FC4}" type="datetimeFigureOut">
               <a:rPr lang="en-US" smtClean="0"/>
-              <a:t>1/27/13</a:t>
+              <a:t>2/24/2026</a:t>
             </a:fld>
             <a:endParaRPr lang="en-US"/>
           </a:p>
@@ -1984,7 +1984,7 @@
           <a:p>
             <a:fld id="{5BCAD085-E8A6-8845-BD4E-CB4CCA059FC4}" type="datetimeFigureOut">
               <a:rPr lang="en-US" smtClean="0"/>
-              <a:t>1/27/13</a:t>
+              <a:t>2/24/2026</a:t>
             </a:fld>
             <a:endParaRPr lang="en-US"/>
           </a:p>
@@ -2087,10 +2087,9 @@
           </a:lstStyle>
           <a:p>
             <a:r>
-              <a:rPr lang="en-US" smtClean="0"/>
+              <a:rPr lang="en-US"/>
               <a:t>Click to edit Master title style</a:t>
             </a:r>
-            <a:endParaRPr lang="en-US"/>
           </a:p>
         </p:txBody>
       </p:sp>
@@ -2144,38 +2143,37 @@
           <a:p>
             <a:pPr lvl="0"/>
             <a:r>
-              <a:rPr lang="en-US" smtClean="0"/>
+              <a:rPr lang="en-US"/>
               <a:t>Click to edit Master text styles</a:t>
             </a:r>
           </a:p>
           <a:p>
             <a:pPr lvl="1"/>
             <a:r>
-              <a:rPr lang="en-US" smtClean="0"/>
+              <a:rPr lang="en-US"/>
               <a:t>Second level</a:t>
             </a:r>
           </a:p>
           <a:p>
             <a:pPr lvl="2"/>
             <a:r>
-              <a:rPr lang="en-US" smtClean="0"/>
+              <a:rPr lang="en-US"/>
               <a:t>Third level</a:t>
             </a:r>
           </a:p>
           <a:p>
             <a:pPr lvl="3"/>
             <a:r>
-              <a:rPr lang="en-US" smtClean="0"/>
+              <a:rPr lang="en-US"/>
               <a:t>Fourth level</a:t>
             </a:r>
           </a:p>
           <a:p>
             <a:pPr lvl="4"/>
             <a:r>
-              <a:rPr lang="en-US" smtClean="0"/>
+              <a:rPr lang="en-US"/>
               <a:t>Fifth level</a:t>
             </a:r>
-            <a:endParaRPr lang="en-US"/>
           </a:p>
         </p:txBody>
       </p:sp>
@@ -2238,7 +2236,7 @@
           <a:p>
             <a:pPr lvl="0"/>
             <a:r>
-              <a:rPr lang="en-US" smtClean="0"/>
+              <a:rPr lang="en-US"/>
               <a:t>Click to edit Master text styles</a:t>
             </a:r>
           </a:p>
@@ -2261,7 +2259,7 @@
           <a:p>
             <a:fld id="{5BCAD085-E8A6-8845-BD4E-CB4CCA059FC4}" type="datetimeFigureOut">
               <a:rPr lang="en-US" smtClean="0"/>
-              <a:t>1/27/13</a:t>
+              <a:t>2/24/2026</a:t>
             </a:fld>
             <a:endParaRPr lang="en-US"/>
           </a:p>
@@ -2364,10 +2362,9 @@
           </a:lstStyle>
           <a:p>
             <a:r>
-              <a:rPr lang="en-US" smtClean="0"/>
+              <a:rPr lang="en-US"/>
               <a:t>Click to edit Master title style</a:t>
             </a:r>
-            <a:endParaRPr lang="en-US"/>
           </a:p>
         </p:txBody>
       </p:sp>
@@ -2491,7 +2488,7 @@
           <a:p>
             <a:pPr lvl="0"/>
             <a:r>
-              <a:rPr lang="en-US" smtClean="0"/>
+              <a:rPr lang="en-US"/>
               <a:t>Click to edit Master text styles</a:t>
             </a:r>
           </a:p>
@@ -2514,7 +2511,7 @@
           <a:p>
             <a:fld id="{5BCAD085-E8A6-8845-BD4E-CB4CCA059FC4}" type="datetimeFigureOut">
               <a:rPr lang="en-US" smtClean="0"/>
-              <a:t>1/27/13</a:t>
+              <a:t>2/24/2026</a:t>
             </a:fld>
             <a:endParaRPr lang="en-US"/>
           </a:p>
@@ -2623,10 +2620,9 @@
           <a:lstStyle/>
           <a:p>
             <a:r>
-              <a:rPr lang="en-US" smtClean="0"/>
+              <a:rPr lang="en-US"/>
               <a:t>Click to edit Master title style</a:t>
             </a:r>
-            <a:endParaRPr lang="en-US"/>
           </a:p>
         </p:txBody>
       </p:sp>
@@ -2657,38 +2653,37 @@
           <a:p>
             <a:pPr lvl="0"/>
             <a:r>
-              <a:rPr lang="en-US" smtClean="0"/>
+              <a:rPr lang="en-US"/>
               <a:t>Click to edit Master text styles</a:t>
             </a:r>
           </a:p>
           <a:p>
             <a:pPr lvl="1"/>
             <a:r>
-              <a:rPr lang="en-US" smtClean="0"/>
+              <a:rPr lang="en-US"/>
               <a:t>Second level</a:t>
             </a:r>
           </a:p>
           <a:p>
             <a:pPr lvl="2"/>
             <a:r>
-              <a:rPr lang="en-US" smtClean="0"/>
+              <a:rPr lang="en-US"/>
               <a:t>Third level</a:t>
             </a:r>
           </a:p>
           <a:p>
             <a:pPr lvl="3"/>
             <a:r>
-              <a:rPr lang="en-US" smtClean="0"/>
+              <a:rPr lang="en-US"/>
               <a:t>Fourth level</a:t>
             </a:r>
           </a:p>
           <a:p>
             <a:pPr lvl="4"/>
             <a:r>
-              <a:rPr lang="en-US" smtClean="0"/>
+              <a:rPr lang="en-US"/>
               <a:t>Fifth level</a:t>
             </a:r>
-            <a:endParaRPr lang="en-US"/>
           </a:p>
         </p:txBody>
       </p:sp>
@@ -2727,7 +2722,7 @@
           <a:p>
             <a:fld id="{5BCAD085-E8A6-8845-BD4E-CB4CCA059FC4}" type="datetimeFigureOut">
               <a:rPr lang="en-US" smtClean="0"/>
-              <a:t>1/27/13</a:t>
+              <a:t>2/24/2026</a:t>
             </a:fld>
             <a:endParaRPr lang="en-US"/>
           </a:p>
@@ -3086,7 +3081,7 @@
 </file>
 
 <file path=ppt/slides/slide1.xml><?xml version="1.0" encoding="utf-8"?>
-<p:sld xmlns:a="http://schemas.openxmlformats.org/drawingml/2006/main" xmlns:p="http://schemas.openxmlformats.org/presentationml/2006/main" xmlns:r="http://schemas.openxmlformats.org/officeDocument/2006/relationships">
+<p:sld xmlns:a="http://schemas.openxmlformats.org/drawingml/2006/main" xmlns:r="http://schemas.openxmlformats.org/officeDocument/2006/relationships" xmlns:p="http://schemas.openxmlformats.org/presentationml/2006/main">
   <p:cSld>
     <p:spTree>
       <p:nvGrpSpPr>
@@ -3094,7 +3089,14 @@
         <p:cNvGrpSpPr/>
         <p:nvPr/>
       </p:nvGrpSpPr>
-      <p:grpSpPr/>
+      <p:grpSpPr>
+        <a:xfrm>
+          <a:off x="0" y="0"/>
+          <a:ext cx="0" cy="0"/>
+          <a:chOff x="0" y="0"/>
+          <a:chExt cx="0" cy="0"/>
+        </a:xfrm>
+      </p:grpSpPr>
       <p:sp>
         <p:nvSpPr>
           <p:cNvPr id="2" name="Title 1"/>
@@ -3146,7 +3148,7 @@
 </file>
 
 <file path=ppt/slides/slide2.xml><?xml version="1.0" encoding="utf-8"?>
-<p:sld xmlns:a="http://schemas.openxmlformats.org/drawingml/2006/main" xmlns:p="http://schemas.openxmlformats.org/presentationml/2006/main" xmlns:r="http://schemas.openxmlformats.org/officeDocument/2006/relationships">
+<p:sld xmlns:a="http://schemas.openxmlformats.org/drawingml/2006/main" xmlns:r="http://schemas.openxmlformats.org/officeDocument/2006/relationships" xmlns:p="http://schemas.openxmlformats.org/presentationml/2006/main">
   <p:cSld>
     <p:spTree>
       <p:nvGrpSpPr>
@@ -3154,7 +3156,14 @@
         <p:cNvGrpSpPr/>
         <p:nvPr/>
       </p:nvGrpSpPr>
-      <p:grpSpPr/>
+      <p:grpSpPr>
+        <a:xfrm>
+          <a:off x="0" y="0"/>
+          <a:ext cx="0" cy="0"/>
+          <a:chOff x="0" y="0"/>
+          <a:chExt cx="0" cy="0"/>
+        </a:xfrm>
+      </p:grpSpPr>
       <p:sp>
         <p:nvSpPr>
           <p:cNvPr id="2" name="Title 1"/>
@@ -3191,7 +3200,6 @@
           <a:bodyPr/>
           <a:lstStyle/>
           <a:p>
-            <a:pPr/>
             <a:r>
               <a:t>Azure</a:t>
             </a:r>
@@ -3215,7 +3223,6 @@
             </a:r>
           </a:p>
           <a:p>
-            <a:pPr/>
             <a:r>
               <a:t>On‑prem</a:t>
             </a:r>
@@ -3243,7 +3250,7 @@
 </file>
 
 <file path=ppt/slides/slide3.xml><?xml version="1.0" encoding="utf-8"?>
-<p:sld xmlns:a="http://schemas.openxmlformats.org/drawingml/2006/main" xmlns:p="http://schemas.openxmlformats.org/presentationml/2006/main" xmlns:r="http://schemas.openxmlformats.org/officeDocument/2006/relationships">
+<p:sld xmlns:a="http://schemas.openxmlformats.org/drawingml/2006/main" xmlns:r="http://schemas.openxmlformats.org/officeDocument/2006/relationships" xmlns:p="http://schemas.openxmlformats.org/presentationml/2006/main">
   <p:cSld>
     <p:spTree>
       <p:nvGrpSpPr>
@@ -3251,7 +3258,14 @@
         <p:cNvGrpSpPr/>
         <p:nvPr/>
       </p:nvGrpSpPr>
-      <p:grpSpPr/>
+      <p:grpSpPr>
+        <a:xfrm>
+          <a:off x="0" y="0"/>
+          <a:ext cx="0" cy="0"/>
+          <a:chOff x="0" y="0"/>
+          <a:chExt cx="0" cy="0"/>
+        </a:xfrm>
+      </p:grpSpPr>
       <p:sp>
         <p:nvSpPr>
           <p:cNvPr id="2" name="Title 1"/>
@@ -3285,47 +3299,61 @@
         </p:nvSpPr>
         <p:spPr/>
         <p:txBody>
-          <a:bodyPr/>
-          <a:lstStyle/>
-          <a:p>
-            <a:pPr/>
-            <a:r>
+          <a:bodyPr>
+            <a:normAutofit fontScale="92500" lnSpcReduction="20000"/>
+          </a:bodyPr>
+          <a:lstStyle/>
+          <a:p>
+            <a:r>
+              <a:rPr dirty="0"/>
               <a:t>Transport</a:t>
             </a:r>
           </a:p>
           <a:p>
             <a:pPr lvl="1"/>
             <a:r>
-              <a:t>ExpressRoute Private Peering for Azure↔on‑prem connectivity</a:t>
+              <a:rPr dirty="0"/>
+              <a:t>ExpressRoute Private Peering for </a:t>
+            </a:r>
+            <a:r>
+              <a:rPr dirty="0" err="1"/>
+              <a:t>Azure↔on‑prem</a:t>
+            </a:r>
+            <a:r>
+              <a:rPr dirty="0"/>
+              <a:t> connectivity</a:t>
             </a:r>
           </a:p>
           <a:p>
             <a:pPr lvl="1"/>
             <a:r>
+              <a:rPr dirty="0"/>
               <a:t>BGP route exchange; avoid hairpins and public Internet dependency</a:t>
             </a:r>
           </a:p>
           <a:p>
-            <a:pPr/>
-            <a:r>
+            <a:r>
+              <a:rPr dirty="0"/>
               <a:t>Resilience (recommended)</a:t>
             </a:r>
           </a:p>
           <a:p>
             <a:pPr lvl="1"/>
             <a:r>
+              <a:rPr dirty="0"/>
               <a:t>Dual circuits or dual peering locations; zone-redundant ER gateway where applicable</a:t>
             </a:r>
           </a:p>
           <a:p>
-            <a:pPr/>
-            <a:r>
+            <a:r>
+              <a:rPr dirty="0"/>
               <a:t>Security</a:t>
             </a:r>
           </a:p>
           <a:p>
             <a:pPr lvl="1"/>
             <a:r>
+              <a:rPr dirty="0"/>
               <a:t>Private routing + TLS end-to-end; restrict management planes; integrate with existing boundary controls</a:t>
             </a:r>
           </a:p>
@@ -3340,7 +3368,7 @@
 </file>
 
 <file path=ppt/slides/slide4.xml><?xml version="1.0" encoding="utf-8"?>
-<p:sld xmlns:a="http://schemas.openxmlformats.org/drawingml/2006/main" xmlns:p="http://schemas.openxmlformats.org/presentationml/2006/main" xmlns:r="http://schemas.openxmlformats.org/officeDocument/2006/relationships">
+<p:sld xmlns:a="http://schemas.openxmlformats.org/drawingml/2006/main" xmlns:r="http://schemas.openxmlformats.org/officeDocument/2006/relationships" xmlns:p="http://schemas.openxmlformats.org/presentationml/2006/main">
   <p:cSld>
     <p:spTree>
       <p:nvGrpSpPr>
@@ -3348,7 +3376,14 @@
         <p:cNvGrpSpPr/>
         <p:nvPr/>
       </p:nvGrpSpPr>
-      <p:grpSpPr/>
+      <p:grpSpPr>
+        <a:xfrm>
+          <a:off x="0" y="0"/>
+          <a:ext cx="0" cy="0"/>
+          <a:chOff x="0" y="0"/>
+          <a:chExt cx="0" cy="0"/>
+        </a:xfrm>
+      </p:grpSpPr>
       <p:sp>
         <p:nvSpPr>
           <p:cNvPr id="2" name="Title 1"/>
@@ -3380,49 +3415,90 @@
             <p:ph idx="1"/>
           </p:nvPr>
         </p:nvSpPr>
-        <p:spPr/>
-        <p:txBody>
-          <a:bodyPr/>
-          <a:lstStyle/>
-          <a:p>
-            <a:pPr/>
-            <a:r>
-              <a:t>Single IdP for Appgate</a:t>
-            </a:r>
+        <p:spPr>
+          <a:xfrm>
+            <a:off x="457200" y="1600200"/>
+            <a:ext cx="8229600" cy="5127558"/>
+          </a:xfrm>
+        </p:spPr>
+        <p:txBody>
+          <a:bodyPr>
+            <a:normAutofit/>
+          </a:bodyPr>
+          <a:lstStyle/>
+          <a:p>
+            <a:r>
+              <a:rPr dirty="0"/>
+              <a:t>Single IdP for </a:t>
+            </a:r>
+            <a:r>
+              <a:rPr dirty="0" err="1"/>
+              <a:t>Appgate</a:t>
+            </a:r>
+            <a:endParaRPr dirty="0"/>
           </a:p>
           <a:p>
             <a:pPr lvl="1"/>
             <a:r>
-              <a:t>Appgate consumes OIDC from Keycloak (SAML fallback).</a:t>
-            </a:r>
-          </a:p>
-          <a:p>
-            <a:pPr/>
-            <a:r>
+              <a:rPr dirty="0" err="1"/>
+              <a:t>Appgate</a:t>
+            </a:r>
+            <a:r>
+              <a:rPr dirty="0"/>
+              <a:t> consumes OIDC from </a:t>
+            </a:r>
+            <a:r>
+              <a:rPr dirty="0" err="1"/>
+              <a:t>Keycloak</a:t>
+            </a:r>
+            <a:r>
+              <a:rPr dirty="0"/>
+              <a:t> (SAML fallback).</a:t>
+            </a:r>
+          </a:p>
+          <a:p>
+            <a:r>
+              <a:rPr dirty="0"/>
               <a:t>Two attribute bags</a:t>
             </a:r>
           </a:p>
           <a:p>
             <a:pPr lvl="1"/>
             <a:r>
-              <a:t>IAB: normalized/authoritative in Keycloak</a:t>
-            </a:r>
+              <a:rPr dirty="0"/>
+              <a:t>IAB: normalized/authoritative in </a:t>
+            </a:r>
+            <a:r>
+              <a:rPr dirty="0" err="1"/>
+              <a:t>Keycloak</a:t>
+            </a:r>
+            <a:endParaRPr dirty="0"/>
           </a:p>
           <a:p>
             <a:pPr lvl="1"/>
             <a:r>
-              <a:t>AAB: authoritative in PingDirectory (Azure) and enriched into claims</a:t>
-            </a:r>
-          </a:p>
-          <a:p>
-            <a:pPr/>
-            <a:r>
+              <a:rPr dirty="0"/>
+              <a:t>AAB: authoritative in </a:t>
+            </a:r>
+            <a:r>
+              <a:rPr dirty="0" err="1"/>
+              <a:t>PingDirectory</a:t>
+            </a:r>
+            <a:r>
+              <a:rPr dirty="0"/>
+              <a:t> (Azure) and enriched into claims</a:t>
+            </a:r>
+          </a:p>
+          <a:p>
+            <a:r>
+              <a:rPr dirty="0"/>
               <a:t>Two upstream identity sources</a:t>
             </a:r>
           </a:p>
           <a:p>
             <a:pPr lvl="1"/>
             <a:r>
+              <a:rPr dirty="0"/>
               <a:t>Entra and AD both onboard users; no sync between them</a:t>
             </a:r>
           </a:p>
@@ -3437,7 +3513,7 @@
 </file>
 
 <file path=ppt/slides/slide5.xml><?xml version="1.0" encoding="utf-8"?>
-<p:sld xmlns:a="http://schemas.openxmlformats.org/drawingml/2006/main" xmlns:p="http://schemas.openxmlformats.org/presentationml/2006/main" xmlns:r="http://schemas.openxmlformats.org/officeDocument/2006/relationships">
+<p:sld xmlns:a="http://schemas.openxmlformats.org/drawingml/2006/main" xmlns:r="http://schemas.openxmlformats.org/officeDocument/2006/relationships" xmlns:p="http://schemas.openxmlformats.org/presentationml/2006/main">
   <p:cSld>
     <p:spTree>
       <p:nvGrpSpPr>
@@ -3445,7 +3521,14 @@
         <p:cNvGrpSpPr/>
         <p:nvPr/>
       </p:nvGrpSpPr>
-      <p:grpSpPr/>
+      <p:grpSpPr>
+        <a:xfrm>
+          <a:off x="0" y="0"/>
+          <a:ext cx="0" cy="0"/>
+          <a:chOff x="0" y="0"/>
+          <a:chExt cx="0" cy="0"/>
+        </a:xfrm>
+      </p:grpSpPr>
       <p:sp>
         <p:nvSpPr>
           <p:cNvPr id="2" name="Title 1"/>
@@ -3462,6 +3545,7 @@
           <a:lstStyle/>
           <a:p>
             <a:r>
+              <a:rPr dirty="0"/>
               <a:t>Identity linking (no UPN)</a:t>
             </a:r>
           </a:p>
@@ -3477,49 +3561,116 @@
             <p:ph idx="1"/>
           </p:nvPr>
         </p:nvSpPr>
-        <p:spPr/>
-        <p:txBody>
-          <a:bodyPr/>
-          <a:lstStyle/>
-          <a:p>
-            <a:pPr/>
-            <a:r>
+        <p:spPr>
+          <a:xfrm>
+            <a:off x="457200" y="1600200"/>
+            <a:ext cx="8229600" cy="5071905"/>
+          </a:xfrm>
+        </p:spPr>
+        <p:txBody>
+          <a:bodyPr>
+            <a:normAutofit lnSpcReduction="10000"/>
+          </a:bodyPr>
+          <a:lstStyle/>
+          <a:p>
+            <a:r>
+              <a:rPr dirty="0"/>
               <a:t>Canonical anchor</a:t>
             </a:r>
           </a:p>
           <a:p>
             <a:pPr lvl="1"/>
             <a:r>
-              <a:t>`globalImmutableId` as the shared anchor across Keycloak + PingDirectory + claims.</a:t>
-            </a:r>
-          </a:p>
-          <a:p>
-            <a:pPr/>
-            <a:r>
+              <a:rPr dirty="0"/>
+              <a:t>`</a:t>
+            </a:r>
+            <a:r>
+              <a:rPr dirty="0" err="1"/>
+              <a:t>globalImmutableId</a:t>
+            </a:r>
+            <a:r>
+              <a:rPr dirty="0"/>
+              <a:t>` as the shared anchor across </a:t>
+            </a:r>
+            <a:r>
+              <a:rPr dirty="0" err="1"/>
+              <a:t>Keycloak</a:t>
+            </a:r>
+            <a:r>
+              <a:rPr dirty="0"/>
+              <a:t> + </a:t>
+            </a:r>
+            <a:r>
+              <a:rPr dirty="0" err="1"/>
+              <a:t>PingDirectory</a:t>
+            </a:r>
+            <a:r>
+              <a:rPr dirty="0"/>
+              <a:t> + claims.</a:t>
+            </a:r>
+          </a:p>
+          <a:p>
+            <a:r>
+              <a:rPr dirty="0"/>
               <a:t>Source mapping</a:t>
             </a:r>
           </a:p>
           <a:p>
             <a:pPr lvl="1"/>
             <a:r>
-              <a:t>Entra: `immutableId/onPremisesImmutableId` → `globalImmutableId`</a:t>
+              <a:rPr dirty="0"/>
+              <a:t>Entra: `</a:t>
+            </a:r>
+            <a:r>
+              <a:rPr dirty="0" err="1"/>
+              <a:t>immutableId</a:t>
+            </a:r>
+            <a:r>
+              <a:rPr dirty="0"/>
+              <a:t>/</a:t>
+            </a:r>
+            <a:r>
+              <a:rPr dirty="0" err="1"/>
+              <a:t>onPremisesImmutableId</a:t>
+            </a:r>
+            <a:r>
+              <a:rPr dirty="0"/>
+              <a:t>` → `</a:t>
+            </a:r>
+            <a:r>
+              <a:rPr dirty="0" err="1"/>
+              <a:t>globalImmutableId</a:t>
+            </a:r>
+            <a:r>
+              <a:rPr dirty="0"/>
+              <a:t>`</a:t>
             </a:r>
           </a:p>
           <a:p>
             <a:pPr lvl="1"/>
             <a:r>
-              <a:t>AD: stamp same value into a write-once AD attribute → `globalImmutableId`</a:t>
-            </a:r>
-          </a:p>
-          <a:p>
-            <a:pPr/>
-            <a:r>
+              <a:rPr dirty="0"/>
+              <a:t>AD: stamp same value into a write-once AD attribute → `</a:t>
+            </a:r>
+            <a:r>
+              <a:rPr dirty="0" err="1"/>
+              <a:t>globalImmutableId</a:t>
+            </a:r>
+            <a:r>
+              <a:rPr dirty="0"/>
+              <a:t>`</a:t>
+            </a:r>
+          </a:p>
+          <a:p>
+            <a:r>
+              <a:rPr dirty="0"/>
               <a:t>Secondary key</a:t>
             </a:r>
           </a:p>
           <a:p>
             <a:pPr lvl="1"/>
             <a:r>
+              <a:rPr dirty="0"/>
               <a:t>`extensionAttribute01` as correlation safety net and migration support</a:t>
             </a:r>
           </a:p>
@@ -3534,7 +3685,7 @@
 </file>
 
 <file path=ppt/slides/slide6.xml><?xml version="1.0" encoding="utf-8"?>
-<p:sld xmlns:a="http://schemas.openxmlformats.org/drawingml/2006/main" xmlns:p="http://schemas.openxmlformats.org/presentationml/2006/main" xmlns:r="http://schemas.openxmlformats.org/officeDocument/2006/relationships">
+<p:sld xmlns:a="http://schemas.openxmlformats.org/drawingml/2006/main" xmlns:r="http://schemas.openxmlformats.org/officeDocument/2006/relationships" xmlns:p="http://schemas.openxmlformats.org/presentationml/2006/main">
   <p:cSld>
     <p:spTree>
       <p:nvGrpSpPr>
@@ -3542,7 +3693,14 @@
         <p:cNvGrpSpPr/>
         <p:nvPr/>
       </p:nvGrpSpPr>
-      <p:grpSpPr/>
+      <p:grpSpPr>
+        <a:xfrm>
+          <a:off x="0" y="0"/>
+          <a:ext cx="0" cy="0"/>
+          <a:chOff x="0" y="0"/>
+          <a:chExt cx="0" cy="0"/>
+        </a:xfrm>
+      </p:grpSpPr>
       <p:sp>
         <p:nvSpPr>
           <p:cNvPr id="2" name="Title 1"/>
@@ -3579,7 +3737,6 @@
           <a:bodyPr/>
           <a:lstStyle/>
           <a:p>
-            <a:pPr/>
             <a:r>
               <a:t>Policy decision</a:t>
             </a:r>
@@ -3591,7 +3748,6 @@
             </a:r>
           </a:p>
           <a:p>
-            <a:pPr/>
             <a:r>
               <a:t>Data plane</a:t>
             </a:r>
@@ -3603,7 +3759,6 @@
             </a:r>
           </a:p>
           <a:p>
-            <a:pPr/>
             <a:r>
               <a:t>Step-up</a:t>
             </a:r>
@@ -3625,7 +3780,7 @@
 </file>
 
 <file path=ppt/slides/slide7.xml><?xml version="1.0" encoding="utf-8"?>
-<p:sld xmlns:a="http://schemas.openxmlformats.org/drawingml/2006/main" xmlns:p="http://schemas.openxmlformats.org/presentationml/2006/main" xmlns:r="http://schemas.openxmlformats.org/officeDocument/2006/relationships">
+<p:sld xmlns:a="http://schemas.openxmlformats.org/drawingml/2006/main" xmlns:r="http://schemas.openxmlformats.org/officeDocument/2006/relationships" xmlns:p="http://schemas.openxmlformats.org/presentationml/2006/main">
   <p:cSld>
     <p:spTree>
       <p:nvGrpSpPr>
@@ -3633,7 +3788,14 @@
         <p:cNvGrpSpPr/>
         <p:nvPr/>
       </p:nvGrpSpPr>
-      <p:grpSpPr/>
+      <p:grpSpPr>
+        <a:xfrm>
+          <a:off x="0" y="0"/>
+          <a:ext cx="0" cy="0"/>
+          <a:chOff x="0" y="0"/>
+          <a:chExt cx="0" cy="0"/>
+        </a:xfrm>
+      </p:grpSpPr>
       <p:sp>
         <p:nvSpPr>
           <p:cNvPr id="2" name="Title 1"/>
@@ -3670,7 +3832,6 @@
           <a:bodyPr/>
           <a:lstStyle/>
           <a:p>
-            <a:pPr/>
             <a:r>
               <a:t>Entra-origin</a:t>
             </a:r>
@@ -3688,7 +3849,6 @@
             </a:r>
           </a:p>
           <a:p>
-            <a:pPr/>
             <a:r>
               <a:t>AD-origin</a:t>
             </a:r>
@@ -3700,7 +3860,6 @@
             </a:r>
           </a:p>
           <a:p>
-            <a:pPr/>
             <a:r>
               <a:t>Scheduled LDAP sync alone will not consistently meet &lt;60 seconds.</a:t>
             </a:r>
@@ -3716,7 +3875,7 @@
 </file>
 
 <file path=ppt/slides/slide8.xml><?xml version="1.0" encoding="utf-8"?>
-<p:sld xmlns:a="http://schemas.openxmlformats.org/drawingml/2006/main" xmlns:p="http://schemas.openxmlformats.org/presentationml/2006/main" xmlns:r="http://schemas.openxmlformats.org/officeDocument/2006/relationships">
+<p:sld xmlns:a="http://schemas.openxmlformats.org/drawingml/2006/main" xmlns:r="http://schemas.openxmlformats.org/officeDocument/2006/relationships" xmlns:p="http://schemas.openxmlformats.org/presentationml/2006/main">
   <p:cSld>
     <p:spTree>
       <p:nvGrpSpPr>
@@ -3724,7 +3883,14 @@
         <p:cNvGrpSpPr/>
         <p:nvPr/>
       </p:nvGrpSpPr>
-      <p:grpSpPr/>
+      <p:grpSpPr>
+        <a:xfrm>
+          <a:off x="0" y="0"/>
+          <a:ext cx="0" cy="0"/>
+          <a:chOff x="0" y="0"/>
+          <a:chExt cx="0" cy="0"/>
+        </a:xfrm>
+      </p:grpSpPr>
       <p:sp>
         <p:nvSpPr>
           <p:cNvPr id="2" name="Title 1"/>
@@ -3756,31 +3922,70 @@
             <p:ph idx="1"/>
           </p:nvPr>
         </p:nvSpPr>
-        <p:spPr/>
-        <p:txBody>
-          <a:bodyPr/>
-          <a:lstStyle/>
-          <a:p>
-            <a:pPr/>
-            <a:r>
-              <a:t>Minting authority + write-once governance for `globalImmutableId` across Entra + AD + PingDirectory.</a:t>
-            </a:r>
-          </a:p>
-          <a:p>
-            <a:pPr/>
-            <a:r>
-              <a:t>AAB schema + claims contract Appgate will consume (roles/scopes/time-bound constraints).</a:t>
-            </a:r>
-          </a:p>
-          <a:p>
-            <a:pPr/>
-            <a:r>
-              <a:t>Degraded-mode rules when PingDirectory is down or ExpressRoute is impaired (deny-by-default for high-trust enclaves).</a:t>
-            </a:r>
-          </a:p>
-          <a:p>
-            <a:pPr/>
-            <a:r>
+        <p:spPr>
+          <a:xfrm>
+            <a:off x="457200" y="1600200"/>
+            <a:ext cx="8229600" cy="4983162"/>
+          </a:xfrm>
+        </p:spPr>
+        <p:txBody>
+          <a:bodyPr>
+            <a:normAutofit fontScale="92500"/>
+          </a:bodyPr>
+          <a:lstStyle/>
+          <a:p>
+            <a:r>
+              <a:rPr dirty="0"/>
+              <a:t>Minting authority + write-once governance for `</a:t>
+            </a:r>
+            <a:r>
+              <a:rPr dirty="0" err="1"/>
+              <a:t>globalImmutableId</a:t>
+            </a:r>
+            <a:r>
+              <a:rPr dirty="0"/>
+              <a:t>` across Entra + AD + </a:t>
+            </a:r>
+            <a:r>
+              <a:rPr dirty="0" err="1"/>
+              <a:t>PingDirectory</a:t>
+            </a:r>
+            <a:r>
+              <a:rPr dirty="0"/>
+              <a:t>.</a:t>
+            </a:r>
+          </a:p>
+          <a:p>
+            <a:r>
+              <a:rPr dirty="0"/>
+              <a:t>AAB schema + claims contract </a:t>
+            </a:r>
+            <a:r>
+              <a:rPr dirty="0" err="1"/>
+              <a:t>Appgate</a:t>
+            </a:r>
+            <a:r>
+              <a:rPr dirty="0"/>
+              <a:t> will consume (roles/scopes/time-bound constraints).</a:t>
+            </a:r>
+          </a:p>
+          <a:p>
+            <a:r>
+              <a:rPr dirty="0"/>
+              <a:t>Degraded-mode rules when </a:t>
+            </a:r>
+            <a:r>
+              <a:rPr dirty="0" err="1"/>
+              <a:t>PingDirectory</a:t>
+            </a:r>
+            <a:r>
+              <a:rPr dirty="0"/>
+              <a:t> is down or ExpressRoute is impaired (deny-by-default for high-trust enclaves).</a:t>
+            </a:r>
+          </a:p>
+          <a:p>
+            <a:r>
+              <a:rPr dirty="0"/>
               <a:t>RTO/RPO targets for Controllers and whether region-loss survivability is required.</a:t>
             </a:r>
           </a:p>

</xml_diff>